<commit_message>
diagrams: added additional supporting images and resolve discrepancies with existing diagrams
</commit_message>
<xml_diff>
--- a/docs/diagrams/EditCommandExample.pptx
+++ b/docs/diagrams/EditCommandExample.pptx
@@ -5,10 +5,10 @@
     <p:sldMasterId id="2147483648" r:id="rId1"/>
   </p:sldMasterIdLst>
   <p:sldIdLst>
-    <p:sldId id="256" r:id="rId3"/>
+    <p:sldId id="256" r:id="rId2"/>
   </p:sldIdLst>
   <p:sldSz cx="12192000" cy="6858000"/>
-  <p:notesSz cx="7103745" cy="10234295"/>
+  <p:notesSz cx="7104063" cy="10234613"/>
   <p:defaultTextStyle>
     <a:defPPr>
       <a:defRPr lang="en-US"/>
@@ -104,6 +104,14 @@
       </a:defRPr>
     </a:lvl9pPr>
   </p:defaultTextStyle>
+  <p:extLst>
+    <p:ext uri="{EFAFB233-063F-42B5-8137-9DF3F51BA10A}">
+      <p15:sldGuideLst xmlns:p15="http://schemas.microsoft.com/office/powerpoint/2012/main"/>
+    </p:ext>
+    <p:ext uri="{2D200454-40CA-4A62-9FC3-DE9A4176ACB9}">
+      <p15:notesGuideLst xmlns:p15="http://schemas.microsoft.com/office/powerpoint/2012/main"/>
+    </p:ext>
+  </p:extLst>
 </p:presentation>
 </file>
 
@@ -149,10 +157,9 @@
           </a:lstStyle>
           <a:p>
             <a:r>
-              <a:rPr lang="en-US" smtClean="0"/>
+              <a:rPr lang="en-US"/>
               <a:t>Click to edit Master title style</a:t>
             </a:r>
-            <a:endParaRPr lang="en-US"/>
           </a:p>
         </p:txBody>
       </p:sp>
@@ -214,10 +221,9 @@
           </a:lstStyle>
           <a:p>
             <a:r>
-              <a:rPr lang="en-US" smtClean="0"/>
+              <a:rPr lang="en-US"/>
               <a:t>Click to edit Master subtitle style</a:t>
             </a:r>
-            <a:endParaRPr lang="en-US"/>
           </a:p>
         </p:txBody>
       </p:sp>
@@ -238,6 +244,7 @@
           <a:p>
             <a:fld id="{FDE934FF-F4E1-47C5-9CA5-30A81DDE2BE4}" type="datetimeFigureOut">
               <a:rPr lang="en-US" smtClean="0"/>
+              <a:t>11/11/2018</a:t>
             </a:fld>
             <a:endParaRPr lang="en-US"/>
           </a:p>
@@ -279,6 +286,7 @@
           <a:p>
             <a:fld id="{B3561BA9-CDCF-4958-B8AB-66F3BF063E13}" type="slidenum">
               <a:rPr lang="en-US" smtClean="0"/>
+              <a:t>‹#›</a:t>
             </a:fld>
             <a:endParaRPr lang="en-US"/>
           </a:p>
@@ -331,42 +339,37 @@
           <a:p>
             <a:pPr lvl="0"/>
             <a:r>
-              <a:rPr lang="en-US" smtClean="0"/>
+              <a:rPr lang="en-US"/>
               <a:t>Click to edit Master text styles</a:t>
             </a:r>
-            <a:endParaRPr lang="en-US" smtClean="0"/>
           </a:p>
           <a:p>
             <a:pPr lvl="1"/>
             <a:r>
-              <a:rPr lang="en-US" smtClean="0"/>
+              <a:rPr lang="en-US"/>
               <a:t>Second level</a:t>
             </a:r>
-            <a:endParaRPr lang="en-US" smtClean="0"/>
           </a:p>
           <a:p>
             <a:pPr lvl="2"/>
             <a:r>
-              <a:rPr lang="en-US" smtClean="0"/>
+              <a:rPr lang="en-US"/>
               <a:t>Third level</a:t>
             </a:r>
-            <a:endParaRPr lang="en-US" smtClean="0"/>
           </a:p>
           <a:p>
             <a:pPr lvl="3"/>
             <a:r>
-              <a:rPr lang="en-US" smtClean="0"/>
+              <a:rPr lang="en-US"/>
               <a:t>Fourth level</a:t>
             </a:r>
-            <a:endParaRPr lang="en-US" smtClean="0"/>
           </a:p>
           <a:p>
             <a:pPr lvl="4"/>
             <a:r>
-              <a:rPr lang="en-US" smtClean="0"/>
+              <a:rPr lang="en-US"/>
               <a:t>Fifth level</a:t>
             </a:r>
-            <a:endParaRPr lang="en-US"/>
           </a:p>
         </p:txBody>
       </p:sp>
@@ -387,6 +390,7 @@
           <a:p>
             <a:fld id="{FDE934FF-F4E1-47C5-9CA5-30A81DDE2BE4}" type="datetimeFigureOut">
               <a:rPr lang="en-US" smtClean="0"/>
+              <a:t>11/11/2018</a:t>
             </a:fld>
             <a:endParaRPr lang="en-US"/>
           </a:p>
@@ -428,6 +432,7 @@
           <a:p>
             <a:fld id="{B3561BA9-CDCF-4958-B8AB-66F3BF063E13}" type="slidenum">
               <a:rPr lang="en-US" smtClean="0"/>
+              <a:t>‹#›</a:t>
             </a:fld>
             <a:endParaRPr lang="en-US"/>
           </a:p>
@@ -474,10 +479,9 @@
           <a:lstStyle/>
           <a:p>
             <a:r>
-              <a:rPr lang="en-US" smtClean="0"/>
+              <a:rPr lang="en-US"/>
               <a:t>Click to edit Master title style</a:t>
             </a:r>
-            <a:endParaRPr lang="en-US"/>
           </a:p>
         </p:txBody>
       </p:sp>
@@ -498,42 +502,37 @@
           <a:p>
             <a:pPr lvl="0"/>
             <a:r>
-              <a:rPr lang="en-US" smtClean="0"/>
+              <a:rPr lang="en-US"/>
               <a:t>Click to edit Master text styles</a:t>
             </a:r>
-            <a:endParaRPr lang="en-US" smtClean="0"/>
           </a:p>
           <a:p>
             <a:pPr lvl="1"/>
             <a:r>
-              <a:rPr lang="en-US" smtClean="0"/>
+              <a:rPr lang="en-US"/>
               <a:t>Second level</a:t>
             </a:r>
-            <a:endParaRPr lang="en-US" smtClean="0"/>
           </a:p>
           <a:p>
             <a:pPr lvl="2"/>
             <a:r>
-              <a:rPr lang="en-US" smtClean="0"/>
+              <a:rPr lang="en-US"/>
               <a:t>Third level</a:t>
             </a:r>
-            <a:endParaRPr lang="en-US" smtClean="0"/>
           </a:p>
           <a:p>
             <a:pPr lvl="3"/>
             <a:r>
-              <a:rPr lang="en-US" smtClean="0"/>
+              <a:rPr lang="en-US"/>
               <a:t>Fourth level</a:t>
             </a:r>
-            <a:endParaRPr lang="en-US" smtClean="0"/>
           </a:p>
           <a:p>
             <a:pPr lvl="4"/>
             <a:r>
-              <a:rPr lang="en-US" smtClean="0"/>
+              <a:rPr lang="en-US"/>
               <a:t>Fifth level</a:t>
             </a:r>
-            <a:endParaRPr lang="en-US"/>
           </a:p>
         </p:txBody>
       </p:sp>
@@ -554,6 +553,7 @@
           <a:p>
             <a:fld id="{FDE934FF-F4E1-47C5-9CA5-30A81DDE2BE4}" type="datetimeFigureOut">
               <a:rPr lang="en-US" smtClean="0"/>
+              <a:t>11/11/2018</a:t>
             </a:fld>
             <a:endParaRPr lang="en-US"/>
           </a:p>
@@ -595,6 +595,7 @@
           <a:p>
             <a:fld id="{B3561BA9-CDCF-4958-B8AB-66F3BF063E13}" type="slidenum">
               <a:rPr lang="en-US" smtClean="0"/>
+              <a:t>‹#›</a:t>
             </a:fld>
             <a:endParaRPr lang="en-US"/>
           </a:p>
@@ -650,10 +651,9 @@
           </a:lstStyle>
           <a:p>
             <a:r>
-              <a:rPr lang="en-US" smtClean="0"/>
+              <a:rPr lang="en-US"/>
               <a:t>Click to edit Master title style</a:t>
             </a:r>
-            <a:endParaRPr lang="en-US"/>
           </a:p>
         </p:txBody>
       </p:sp>
@@ -770,10 +770,9 @@
           <a:p>
             <a:pPr lvl="0"/>
             <a:r>
-              <a:rPr lang="en-US" smtClean="0"/>
+              <a:rPr lang="en-US"/>
               <a:t>Click to edit Master text styles</a:t>
             </a:r>
-            <a:endParaRPr lang="en-US" smtClean="0"/>
           </a:p>
         </p:txBody>
       </p:sp>
@@ -794,6 +793,7 @@
           <a:p>
             <a:fld id="{FDE934FF-F4E1-47C5-9CA5-30A81DDE2BE4}" type="datetimeFigureOut">
               <a:rPr lang="en-US" smtClean="0"/>
+              <a:t>11/11/2018</a:t>
             </a:fld>
             <a:endParaRPr lang="en-US"/>
           </a:p>
@@ -835,6 +835,7 @@
           <a:p>
             <a:fld id="{B3561BA9-CDCF-4958-B8AB-66F3BF063E13}" type="slidenum">
               <a:rPr lang="en-US" smtClean="0"/>
+              <a:t>‹#›</a:t>
             </a:fld>
             <a:endParaRPr lang="en-US"/>
           </a:p>
@@ -881,10 +882,9 @@
           <a:lstStyle/>
           <a:p>
             <a:r>
-              <a:rPr lang="en-US" smtClean="0"/>
+              <a:rPr lang="en-US"/>
               <a:t>Click to edit Master title style</a:t>
             </a:r>
-            <a:endParaRPr lang="en-US"/>
           </a:p>
         </p:txBody>
       </p:sp>
@@ -910,42 +910,37 @@
           <a:p>
             <a:pPr lvl="0"/>
             <a:r>
-              <a:rPr lang="en-US" smtClean="0"/>
+              <a:rPr lang="en-US"/>
               <a:t>Click to edit Master text styles</a:t>
             </a:r>
-            <a:endParaRPr lang="en-US" smtClean="0"/>
           </a:p>
           <a:p>
             <a:pPr lvl="1"/>
             <a:r>
-              <a:rPr lang="en-US" smtClean="0"/>
+              <a:rPr lang="en-US"/>
               <a:t>Second level</a:t>
             </a:r>
-            <a:endParaRPr lang="en-US" smtClean="0"/>
           </a:p>
           <a:p>
             <a:pPr lvl="2"/>
             <a:r>
-              <a:rPr lang="en-US" smtClean="0"/>
+              <a:rPr lang="en-US"/>
               <a:t>Third level</a:t>
             </a:r>
-            <a:endParaRPr lang="en-US" smtClean="0"/>
           </a:p>
           <a:p>
             <a:pPr lvl="3"/>
             <a:r>
-              <a:rPr lang="en-US" smtClean="0"/>
+              <a:rPr lang="en-US"/>
               <a:t>Fourth level</a:t>
             </a:r>
-            <a:endParaRPr lang="en-US" smtClean="0"/>
           </a:p>
           <a:p>
             <a:pPr lvl="4"/>
             <a:r>
-              <a:rPr lang="en-US" smtClean="0"/>
+              <a:rPr lang="en-US"/>
               <a:t>Fifth level</a:t>
             </a:r>
-            <a:endParaRPr lang="en-US"/>
           </a:p>
         </p:txBody>
       </p:sp>
@@ -971,42 +966,37 @@
           <a:p>
             <a:pPr lvl="0"/>
             <a:r>
-              <a:rPr lang="en-US" smtClean="0"/>
+              <a:rPr lang="en-US"/>
               <a:t>Click to edit Master text styles</a:t>
             </a:r>
-            <a:endParaRPr lang="en-US" smtClean="0"/>
           </a:p>
           <a:p>
             <a:pPr lvl="1"/>
             <a:r>
-              <a:rPr lang="en-US" smtClean="0"/>
+              <a:rPr lang="en-US"/>
               <a:t>Second level</a:t>
             </a:r>
-            <a:endParaRPr lang="en-US" smtClean="0"/>
           </a:p>
           <a:p>
             <a:pPr lvl="2"/>
             <a:r>
-              <a:rPr lang="en-US" smtClean="0"/>
+              <a:rPr lang="en-US"/>
               <a:t>Third level</a:t>
             </a:r>
-            <a:endParaRPr lang="en-US" smtClean="0"/>
           </a:p>
           <a:p>
             <a:pPr lvl="3"/>
             <a:r>
-              <a:rPr lang="en-US" smtClean="0"/>
+              <a:rPr lang="en-US"/>
               <a:t>Fourth level</a:t>
             </a:r>
-            <a:endParaRPr lang="en-US" smtClean="0"/>
           </a:p>
           <a:p>
             <a:pPr lvl="4"/>
             <a:r>
-              <a:rPr lang="en-US" smtClean="0"/>
+              <a:rPr lang="en-US"/>
               <a:t>Fifth level</a:t>
             </a:r>
-            <a:endParaRPr lang="en-US"/>
           </a:p>
         </p:txBody>
       </p:sp>
@@ -1027,6 +1017,7 @@
           <a:p>
             <a:fld id="{FDE934FF-F4E1-47C5-9CA5-30A81DDE2BE4}" type="datetimeFigureOut">
               <a:rPr lang="en-US" smtClean="0"/>
+              <a:t>11/11/2018</a:t>
             </a:fld>
             <a:endParaRPr lang="en-US"/>
           </a:p>
@@ -1068,6 +1059,7 @@
           <a:p>
             <a:fld id="{B3561BA9-CDCF-4958-B8AB-66F3BF063E13}" type="slidenum">
               <a:rPr lang="en-US" smtClean="0"/>
+              <a:t>‹#›</a:t>
             </a:fld>
             <a:endParaRPr lang="en-US"/>
           </a:p>
@@ -1119,10 +1111,9 @@
           <a:lstStyle/>
           <a:p>
             <a:r>
-              <a:rPr lang="en-US" smtClean="0"/>
+              <a:rPr lang="en-US"/>
               <a:t>Click to edit Master title style</a:t>
             </a:r>
-            <a:endParaRPr lang="en-US"/>
           </a:p>
         </p:txBody>
       </p:sp>
@@ -1185,10 +1176,9 @@
           <a:p>
             <a:pPr lvl="0"/>
             <a:r>
-              <a:rPr lang="en-US" smtClean="0"/>
+              <a:rPr lang="en-US"/>
               <a:t>Click to edit Master text styles</a:t>
             </a:r>
-            <a:endParaRPr lang="en-US" smtClean="0"/>
           </a:p>
         </p:txBody>
       </p:sp>
@@ -1214,42 +1204,37 @@
           <a:p>
             <a:pPr lvl="0"/>
             <a:r>
-              <a:rPr lang="en-US" smtClean="0"/>
+              <a:rPr lang="en-US"/>
               <a:t>Click to edit Master text styles</a:t>
             </a:r>
-            <a:endParaRPr lang="en-US" smtClean="0"/>
           </a:p>
           <a:p>
             <a:pPr lvl="1"/>
             <a:r>
-              <a:rPr lang="en-US" smtClean="0"/>
+              <a:rPr lang="en-US"/>
               <a:t>Second level</a:t>
             </a:r>
-            <a:endParaRPr lang="en-US" smtClean="0"/>
           </a:p>
           <a:p>
             <a:pPr lvl="2"/>
             <a:r>
-              <a:rPr lang="en-US" smtClean="0"/>
+              <a:rPr lang="en-US"/>
               <a:t>Third level</a:t>
             </a:r>
-            <a:endParaRPr lang="en-US" smtClean="0"/>
           </a:p>
           <a:p>
             <a:pPr lvl="3"/>
             <a:r>
-              <a:rPr lang="en-US" smtClean="0"/>
+              <a:rPr lang="en-US"/>
               <a:t>Fourth level</a:t>
             </a:r>
-            <a:endParaRPr lang="en-US" smtClean="0"/>
           </a:p>
           <a:p>
             <a:pPr lvl="4"/>
             <a:r>
-              <a:rPr lang="en-US" smtClean="0"/>
+              <a:rPr lang="en-US"/>
               <a:t>Fifth level</a:t>
             </a:r>
-            <a:endParaRPr lang="en-US"/>
           </a:p>
         </p:txBody>
       </p:sp>
@@ -1312,10 +1297,9 @@
           <a:p>
             <a:pPr lvl="0"/>
             <a:r>
-              <a:rPr lang="en-US" smtClean="0"/>
+              <a:rPr lang="en-US"/>
               <a:t>Click to edit Master text styles</a:t>
             </a:r>
-            <a:endParaRPr lang="en-US" smtClean="0"/>
           </a:p>
         </p:txBody>
       </p:sp>
@@ -1341,42 +1325,37 @@
           <a:p>
             <a:pPr lvl="0"/>
             <a:r>
-              <a:rPr lang="en-US" smtClean="0"/>
+              <a:rPr lang="en-US"/>
               <a:t>Click to edit Master text styles</a:t>
             </a:r>
-            <a:endParaRPr lang="en-US" smtClean="0"/>
           </a:p>
           <a:p>
             <a:pPr lvl="1"/>
             <a:r>
-              <a:rPr lang="en-US" smtClean="0"/>
+              <a:rPr lang="en-US"/>
               <a:t>Second level</a:t>
             </a:r>
-            <a:endParaRPr lang="en-US" smtClean="0"/>
           </a:p>
           <a:p>
             <a:pPr lvl="2"/>
             <a:r>
-              <a:rPr lang="en-US" smtClean="0"/>
+              <a:rPr lang="en-US"/>
               <a:t>Third level</a:t>
             </a:r>
-            <a:endParaRPr lang="en-US" smtClean="0"/>
           </a:p>
           <a:p>
             <a:pPr lvl="3"/>
             <a:r>
-              <a:rPr lang="en-US" smtClean="0"/>
+              <a:rPr lang="en-US"/>
               <a:t>Fourth level</a:t>
             </a:r>
-            <a:endParaRPr lang="en-US" smtClean="0"/>
           </a:p>
           <a:p>
             <a:pPr lvl="4"/>
             <a:r>
-              <a:rPr lang="en-US" smtClean="0"/>
+              <a:rPr lang="en-US"/>
               <a:t>Fifth level</a:t>
             </a:r>
-            <a:endParaRPr lang="en-US"/>
           </a:p>
         </p:txBody>
       </p:sp>
@@ -1397,6 +1376,7 @@
           <a:p>
             <a:fld id="{FDE934FF-F4E1-47C5-9CA5-30A81DDE2BE4}" type="datetimeFigureOut">
               <a:rPr lang="en-US" smtClean="0"/>
+              <a:t>11/11/2018</a:t>
             </a:fld>
             <a:endParaRPr lang="en-US"/>
           </a:p>
@@ -1438,6 +1418,7 @@
           <a:p>
             <a:fld id="{B3561BA9-CDCF-4958-B8AB-66F3BF063E13}" type="slidenum">
               <a:rPr lang="en-US" smtClean="0"/>
+              <a:t>‹#›</a:t>
             </a:fld>
             <a:endParaRPr lang="en-US"/>
           </a:p>
@@ -1484,10 +1465,9 @@
           <a:lstStyle/>
           <a:p>
             <a:r>
-              <a:rPr lang="en-US" smtClean="0"/>
+              <a:rPr lang="en-US"/>
               <a:t>Click to edit Master title style</a:t>
             </a:r>
-            <a:endParaRPr lang="en-US"/>
           </a:p>
         </p:txBody>
       </p:sp>
@@ -1508,6 +1488,7 @@
           <a:p>
             <a:fld id="{FDE934FF-F4E1-47C5-9CA5-30A81DDE2BE4}" type="datetimeFigureOut">
               <a:rPr lang="en-US" smtClean="0"/>
+              <a:t>11/11/2018</a:t>
             </a:fld>
             <a:endParaRPr lang="en-US"/>
           </a:p>
@@ -1549,6 +1530,7 @@
           <a:p>
             <a:fld id="{B3561BA9-CDCF-4958-B8AB-66F3BF063E13}" type="slidenum">
               <a:rPr lang="en-US" smtClean="0"/>
+              <a:t>‹#›</a:t>
             </a:fld>
             <a:endParaRPr lang="en-US"/>
           </a:p>
@@ -1596,6 +1578,7 @@
           <a:p>
             <a:fld id="{FDE934FF-F4E1-47C5-9CA5-30A81DDE2BE4}" type="datetimeFigureOut">
               <a:rPr lang="en-US" smtClean="0"/>
+              <a:t>11/11/2018</a:t>
             </a:fld>
             <a:endParaRPr lang="en-US"/>
           </a:p>
@@ -1637,6 +1620,7 @@
           <a:p>
             <a:fld id="{B3561BA9-CDCF-4958-B8AB-66F3BF063E13}" type="slidenum">
               <a:rPr lang="en-US" smtClean="0"/>
+              <a:t>‹#›</a:t>
             </a:fld>
             <a:endParaRPr lang="en-US"/>
           </a:p>
@@ -1692,10 +1676,9 @@
           </a:lstStyle>
           <a:p>
             <a:r>
-              <a:rPr lang="en-US" smtClean="0"/>
+              <a:rPr lang="en-US"/>
               <a:t>Click to edit Master title style</a:t>
             </a:r>
-            <a:endParaRPr lang="en-US"/>
           </a:p>
         </p:txBody>
       </p:sp>
@@ -1819,10 +1802,9 @@
           <a:p>
             <a:pPr lvl="0"/>
             <a:r>
-              <a:rPr lang="en-US" smtClean="0"/>
+              <a:rPr lang="en-US"/>
               <a:t>Click to edit Master text styles</a:t>
             </a:r>
-            <a:endParaRPr lang="en-US" smtClean="0"/>
           </a:p>
         </p:txBody>
       </p:sp>
@@ -1843,6 +1825,7 @@
           <a:p>
             <a:fld id="{FDE934FF-F4E1-47C5-9CA5-30A81DDE2BE4}" type="datetimeFigureOut">
               <a:rPr lang="en-US" smtClean="0"/>
+              <a:t>11/11/2018</a:t>
             </a:fld>
             <a:endParaRPr lang="en-US"/>
           </a:p>
@@ -1884,6 +1867,7 @@
           <a:p>
             <a:fld id="{B3561BA9-CDCF-4958-B8AB-66F3BF063E13}" type="slidenum">
               <a:rPr lang="en-US" smtClean="0"/>
+              <a:t>‹#›</a:t>
             </a:fld>
             <a:endParaRPr lang="en-US"/>
           </a:p>
@@ -1894,13 +1878,6 @@
   <p:clrMapOvr>
     <a:masterClrMapping/>
   </p:clrMapOvr>
-  <p:timing>
-    <p:tnLst>
-      <p:par>
-        <p:cTn id="1" dur="indefinite" restart="never" nodeType="tmRoot"/>
-      </p:par>
-    </p:tnLst>
-  </p:timing>
 </p:sldLayout>
 </file>
 
@@ -1942,10 +1919,9 @@
           <a:lstStyle/>
           <a:p>
             <a:r>
-              <a:rPr lang="en-US" smtClean="0"/>
+              <a:rPr lang="en-US"/>
               <a:t>Click to edit Master title style</a:t>
             </a:r>
-            <a:endParaRPr lang="en-US"/>
           </a:p>
         </p:txBody>
       </p:sp>
@@ -1971,42 +1947,37 @@
           <a:p>
             <a:pPr lvl="0"/>
             <a:r>
-              <a:rPr lang="en-US" smtClean="0"/>
+              <a:rPr lang="en-US"/>
               <a:t>Click to edit Master text styles</a:t>
             </a:r>
-            <a:endParaRPr lang="en-US" smtClean="0"/>
           </a:p>
           <a:p>
             <a:pPr lvl="1"/>
             <a:r>
-              <a:rPr lang="en-US" smtClean="0"/>
+              <a:rPr lang="en-US"/>
               <a:t>Second level</a:t>
             </a:r>
-            <a:endParaRPr lang="en-US" smtClean="0"/>
           </a:p>
           <a:p>
             <a:pPr lvl="2"/>
             <a:r>
-              <a:rPr lang="en-US" smtClean="0"/>
+              <a:rPr lang="en-US"/>
               <a:t>Third level</a:t>
             </a:r>
-            <a:endParaRPr lang="en-US" smtClean="0"/>
           </a:p>
           <a:p>
             <a:pPr lvl="3"/>
             <a:r>
-              <a:rPr lang="en-US" smtClean="0"/>
+              <a:rPr lang="en-US"/>
               <a:t>Fourth level</a:t>
             </a:r>
-            <a:endParaRPr lang="en-US" smtClean="0"/>
           </a:p>
           <a:p>
             <a:pPr lvl="4"/>
             <a:r>
-              <a:rPr lang="en-US" smtClean="0"/>
+              <a:rPr lang="en-US"/>
               <a:t>Fifth level</a:t>
             </a:r>
-            <a:endParaRPr lang="en-US"/>
           </a:p>
         </p:txBody>
       </p:sp>
@@ -2027,6 +1998,7 @@
           <a:p>
             <a:fld id="{FDE934FF-F4E1-47C5-9CA5-30A81DDE2BE4}" type="datetimeFigureOut">
               <a:rPr lang="en-US" smtClean="0"/>
+              <a:t>11/11/2018</a:t>
             </a:fld>
             <a:endParaRPr lang="en-US"/>
           </a:p>
@@ -2068,6 +2040,7 @@
           <a:p>
             <a:fld id="{B3561BA9-CDCF-4958-B8AB-66F3BF063E13}" type="slidenum">
               <a:rPr lang="en-US" smtClean="0"/>
+              <a:t>‹#›</a:t>
             </a:fld>
             <a:endParaRPr lang="en-US"/>
           </a:p>
@@ -2129,10 +2102,9 @@
           <a:lstStyle/>
           <a:p>
             <a:r>
-              <a:rPr lang="en-US" smtClean="0"/>
+              <a:rPr lang="en-US"/>
               <a:t>Click to edit Master title style</a:t>
             </a:r>
-            <a:endParaRPr lang="en-US"/>
           </a:p>
         </p:txBody>
       </p:sp>
@@ -2163,42 +2135,37 @@
           <a:p>
             <a:pPr lvl="0"/>
             <a:r>
-              <a:rPr lang="en-US" smtClean="0"/>
+              <a:rPr lang="en-US"/>
               <a:t>Click to edit Master text styles</a:t>
             </a:r>
-            <a:endParaRPr lang="en-US" smtClean="0"/>
           </a:p>
           <a:p>
             <a:pPr lvl="1"/>
             <a:r>
-              <a:rPr lang="en-US" smtClean="0"/>
+              <a:rPr lang="en-US"/>
               <a:t>Second level</a:t>
             </a:r>
-            <a:endParaRPr lang="en-US" smtClean="0"/>
           </a:p>
           <a:p>
             <a:pPr lvl="2"/>
             <a:r>
-              <a:rPr lang="en-US" smtClean="0"/>
+              <a:rPr lang="en-US"/>
               <a:t>Third level</a:t>
             </a:r>
-            <a:endParaRPr lang="en-US" smtClean="0"/>
           </a:p>
           <a:p>
             <a:pPr lvl="3"/>
             <a:r>
-              <a:rPr lang="en-US" smtClean="0"/>
+              <a:rPr lang="en-US"/>
               <a:t>Fourth level</a:t>
             </a:r>
-            <a:endParaRPr lang="en-US" smtClean="0"/>
           </a:p>
           <a:p>
             <a:pPr lvl="4"/>
             <a:r>
-              <a:rPr lang="en-US" smtClean="0"/>
+              <a:rPr lang="en-US"/>
               <a:t>Fifth level</a:t>
             </a:r>
-            <a:endParaRPr lang="en-US"/>
           </a:p>
         </p:txBody>
       </p:sp>
@@ -2237,6 +2204,7 @@
           <a:p>
             <a:fld id="{FDE934FF-F4E1-47C5-9CA5-30A81DDE2BE4}" type="datetimeFigureOut">
               <a:rPr lang="en-US" smtClean="0"/>
+              <a:t>11/11/2018</a:t>
             </a:fld>
             <a:endParaRPr lang="en-US"/>
           </a:p>
@@ -2314,6 +2282,7 @@
           <a:p>
             <a:fld id="{B3561BA9-CDCF-4958-B8AB-66F3BF063E13}" type="slidenum">
               <a:rPr lang="en-US" smtClean="0"/>
+              <a:t>‹#›</a:t>
             </a:fld>
             <a:endParaRPr lang="en-US"/>
           </a:p>
@@ -2626,31 +2595,14 @@
         <p:cNvGrpSpPr/>
         <p:nvPr/>
       </p:nvGrpSpPr>
-      <p:grpSpPr/>
-      <p:pic>
-        <p:nvPicPr>
-          <p:cNvPr id="11" name="Picture 10" descr="UserTabPane_after_edit"/>
-          <p:cNvPicPr>
-            <a:picLocks noChangeAspect="1"/>
-          </p:cNvPicPr>
-          <p:nvPr/>
-        </p:nvPicPr>
-        <p:blipFill>
-          <a:blip r:embed="rId1"/>
-          <a:stretch>
-            <a:fillRect/>
-          </a:stretch>
-        </p:blipFill>
-        <p:spPr>
-          <a:xfrm>
-            <a:off x="5855335" y="1414780"/>
-            <a:ext cx="2875915" cy="4028440"/>
-          </a:xfrm>
-          <a:prstGeom prst="rect">
-            <a:avLst/>
-          </a:prstGeom>
-        </p:spPr>
-      </p:pic>
+      <p:grpSpPr>
+        <a:xfrm>
+          <a:off x="0" y="0"/>
+          <a:ext cx="0" cy="0"/>
+          <a:chOff x="0" y="0"/>
+          <a:chExt cx="0" cy="0"/>
+        </a:xfrm>
+      </p:grpSpPr>
       <p:pic>
         <p:nvPicPr>
           <p:cNvPr id="10" name="Picture 9" descr="UserDetails_before_edit"/>
@@ -2675,87 +2627,6 @@
           </a:prstGeom>
         </p:spPr>
       </p:pic>
-      <p:sp>
-        <p:nvSpPr>
-          <p:cNvPr id="13" name="Rounded Rectangle 12"/>
-          <p:cNvSpPr/>
-          <p:nvPr/>
-        </p:nvSpPr>
-        <p:spPr>
-          <a:xfrm>
-            <a:off x="7152640" y="3108325"/>
-            <a:ext cx="1550670" cy="1919605"/>
-          </a:xfrm>
-          <a:prstGeom prst="roundRect">
-            <a:avLst>
-              <a:gd name="adj" fmla="val 8333"/>
-            </a:avLst>
-          </a:prstGeom>
-          <a:noFill/>
-          <a:ln w="38100">
-            <a:solidFill>
-              <a:srgbClr val="FF0000"/>
-            </a:solidFill>
-          </a:ln>
-          <a:extLst>
-            <a:ext uri="{909E8E84-426E-40DD-AFC4-6F175D3DCCD1}">
-              <a14:hiddenFill xmlns:a14="http://schemas.microsoft.com/office/drawing/2010/main">
-                <a:solidFill>
-                  <a:schemeClr val="accent1"/>
-                </a:solidFill>
-              </a14:hiddenFill>
-            </a:ext>
-          </a:extLst>
-        </p:spPr>
-        <p:style>
-          <a:lnRef idx="2">
-            <a:schemeClr val="accent1">
-              <a:shade val="50000"/>
-            </a:schemeClr>
-          </a:lnRef>
-          <a:fillRef idx="1">
-            <a:schemeClr val="accent1"/>
-          </a:fillRef>
-          <a:effectRef idx="0">
-            <a:schemeClr val="accent1"/>
-          </a:effectRef>
-          <a:fontRef idx="minor">
-            <a:schemeClr val="lt1"/>
-          </a:fontRef>
-        </p:style>
-        <p:txBody>
-          <a:bodyPr rtlCol="0" anchor="ctr"/>
-          <a:p>
-            <a:pPr algn="ctr"/>
-            <a:endParaRPr lang="en-US"/>
-          </a:p>
-        </p:txBody>
-      </p:sp>
-      <p:pic>
-        <p:nvPicPr>
-          <p:cNvPr id="14" name="Picture 13" descr="edit_command"/>
-          <p:cNvPicPr>
-            <a:picLocks noChangeAspect="1"/>
-          </p:cNvPicPr>
-          <p:nvPr/>
-        </p:nvPicPr>
-        <p:blipFill>
-          <a:blip r:embed="rId3"/>
-          <a:srcRect r="34216"/>
-          <a:stretch>
-            <a:fillRect/>
-          </a:stretch>
-        </p:blipFill>
-        <p:spPr>
-          <a:xfrm>
-            <a:off x="2806700" y="332740"/>
-            <a:ext cx="5049520" cy="847725"/>
-          </a:xfrm>
-          <a:prstGeom prst="rect">
-            <a:avLst/>
-          </a:prstGeom>
-        </p:spPr>
-      </p:pic>
       <p:cxnSp>
         <p:nvCxnSpPr>
           <p:cNvPr id="15" name="Straight Arrow Connector 14"/>
@@ -2764,7 +2635,7 @@
         </p:nvCxnSpPr>
         <p:spPr>
           <a:xfrm flipV="1">
-            <a:off x="4733290" y="2265680"/>
+            <a:off x="4918905" y="3315141"/>
             <a:ext cx="1790700" cy="1270"/>
           </a:xfrm>
           <a:prstGeom prst="straightConnector1">
@@ -2809,6 +2680,7 @@
             </a:avLst>
           </a:prstGeom>
           <a:noFill/>
+          <a:ln w="38100"/>
           <a:extLst>
             <a:ext uri="{909E8E84-426E-40DD-AFC4-6F175D3DCCD1}">
               <a14:hiddenFill xmlns:a14="http://schemas.microsoft.com/office/drawing/2010/main">
@@ -2835,68 +2707,172 @@
         </p:style>
         <p:txBody>
           <a:bodyPr rtlCol="0" anchor="ctr"/>
+          <a:lstStyle/>
           <a:p>
             <a:pPr algn="ctr"/>
             <a:endParaRPr lang="en-US"/>
           </a:p>
         </p:txBody>
       </p:sp>
-      <p:sp>
-        <p:nvSpPr>
-          <p:cNvPr id="17" name="Rounded Rectangle 16"/>
-          <p:cNvSpPr/>
+      <p:grpSp>
+        <p:nvGrpSpPr>
+          <p:cNvPr id="4" name="Group 3">
+            <a:extLst>
+              <a:ext uri="{FF2B5EF4-FFF2-40B4-BE49-F238E27FC236}">
+                <a16:creationId xmlns:a16="http://schemas.microsoft.com/office/drawing/2014/main" id="{A0987AE5-CA61-4C22-B713-F2A7C7A77B42}"/>
+              </a:ext>
+            </a:extLst>
+          </p:cNvPr>
+          <p:cNvGrpSpPr/>
           <p:nvPr/>
-        </p:nvSpPr>
-        <p:spPr>
+        </p:nvGrpSpPr>
+        <p:grpSpPr>
           <a:xfrm>
-            <a:off x="6792595" y="1879600"/>
-            <a:ext cx="1910080" cy="459740"/>
+            <a:off x="6751075" y="1414780"/>
+            <a:ext cx="2875915" cy="4028440"/>
+            <a:chOff x="5855335" y="1414780"/>
+            <a:chExt cx="2875915" cy="4028440"/>
           </a:xfrm>
-          <a:prstGeom prst="roundRect">
-            <a:avLst>
-              <a:gd name="adj" fmla="val 8333"/>
-            </a:avLst>
-          </a:prstGeom>
-          <a:noFill/>
-          <a:ln w="38100">
-            <a:solidFill>
-              <a:srgbClr val="FF0000"/>
-            </a:solidFill>
-          </a:ln>
-          <a:extLst>
-            <a:ext uri="{909E8E84-426E-40DD-AFC4-6F175D3DCCD1}">
-              <a14:hiddenFill xmlns:a14="http://schemas.microsoft.com/office/drawing/2010/main">
-                <a:solidFill>
-                  <a:schemeClr val="accent1"/>
-                </a:solidFill>
-              </a14:hiddenFill>
-            </a:ext>
-          </a:extLst>
-        </p:spPr>
-        <p:style>
-          <a:lnRef idx="2">
-            <a:schemeClr val="accent1">
-              <a:shade val="50000"/>
-            </a:schemeClr>
-          </a:lnRef>
-          <a:fillRef idx="1">
-            <a:schemeClr val="accent1"/>
-          </a:fillRef>
-          <a:effectRef idx="0">
-            <a:schemeClr val="accent1"/>
-          </a:effectRef>
-          <a:fontRef idx="minor">
-            <a:schemeClr val="lt1"/>
-          </a:fontRef>
-        </p:style>
-        <p:txBody>
-          <a:bodyPr rtlCol="0" anchor="ctr"/>
-          <a:p>
-            <a:pPr algn="ctr"/>
-            <a:endParaRPr lang="en-US"/>
-          </a:p>
-        </p:txBody>
-      </p:sp>
+        </p:grpSpPr>
+        <p:pic>
+          <p:nvPicPr>
+            <p:cNvPr id="11" name="Picture 10" descr="UserTabPane_after_edit"/>
+            <p:cNvPicPr>
+              <a:picLocks noChangeAspect="1"/>
+            </p:cNvPicPr>
+            <p:nvPr/>
+          </p:nvPicPr>
+          <p:blipFill>
+            <a:blip r:embed="rId3"/>
+            <a:stretch>
+              <a:fillRect/>
+            </a:stretch>
+          </p:blipFill>
+          <p:spPr>
+            <a:xfrm>
+              <a:off x="5855335" y="1414780"/>
+              <a:ext cx="2875915" cy="4028440"/>
+            </a:xfrm>
+            <a:prstGeom prst="rect">
+              <a:avLst/>
+            </a:prstGeom>
+          </p:spPr>
+        </p:pic>
+        <p:sp>
+          <p:nvSpPr>
+            <p:cNvPr id="13" name="Rounded Rectangle 12"/>
+            <p:cNvSpPr/>
+            <p:nvPr/>
+          </p:nvSpPr>
+          <p:spPr>
+            <a:xfrm>
+              <a:off x="7152640" y="3108325"/>
+              <a:ext cx="1550670" cy="1919605"/>
+            </a:xfrm>
+            <a:prstGeom prst="roundRect">
+              <a:avLst>
+                <a:gd name="adj" fmla="val 8333"/>
+              </a:avLst>
+            </a:prstGeom>
+            <a:noFill/>
+            <a:ln w="38100">
+              <a:solidFill>
+                <a:srgbClr val="FF0000"/>
+              </a:solidFill>
+            </a:ln>
+            <a:extLst>
+              <a:ext uri="{909E8E84-426E-40DD-AFC4-6F175D3DCCD1}">
+                <a14:hiddenFill xmlns:a14="http://schemas.microsoft.com/office/drawing/2010/main">
+                  <a:solidFill>
+                    <a:schemeClr val="accent1"/>
+                  </a:solidFill>
+                </a14:hiddenFill>
+              </a:ext>
+            </a:extLst>
+          </p:spPr>
+          <p:style>
+            <a:lnRef idx="2">
+              <a:schemeClr val="accent1">
+                <a:shade val="50000"/>
+              </a:schemeClr>
+            </a:lnRef>
+            <a:fillRef idx="1">
+              <a:schemeClr val="accent1"/>
+            </a:fillRef>
+            <a:effectRef idx="0">
+              <a:schemeClr val="accent1"/>
+            </a:effectRef>
+            <a:fontRef idx="minor">
+              <a:schemeClr val="lt1"/>
+            </a:fontRef>
+          </p:style>
+          <p:txBody>
+            <a:bodyPr rtlCol="0" anchor="ctr"/>
+            <a:lstStyle/>
+            <a:p>
+              <a:pPr algn="ctr"/>
+              <a:endParaRPr lang="en-US"/>
+            </a:p>
+          </p:txBody>
+        </p:sp>
+        <p:sp>
+          <p:nvSpPr>
+            <p:cNvPr id="17" name="Rounded Rectangle 16"/>
+            <p:cNvSpPr/>
+            <p:nvPr/>
+          </p:nvSpPr>
+          <p:spPr>
+            <a:xfrm>
+              <a:off x="6792595" y="1879600"/>
+              <a:ext cx="1910080" cy="459740"/>
+            </a:xfrm>
+            <a:prstGeom prst="roundRect">
+              <a:avLst>
+                <a:gd name="adj" fmla="val 8333"/>
+              </a:avLst>
+            </a:prstGeom>
+            <a:noFill/>
+            <a:ln w="38100">
+              <a:solidFill>
+                <a:srgbClr val="FF0000"/>
+              </a:solidFill>
+            </a:ln>
+            <a:extLst>
+              <a:ext uri="{909E8E84-426E-40DD-AFC4-6F175D3DCCD1}">
+                <a14:hiddenFill xmlns:a14="http://schemas.microsoft.com/office/drawing/2010/main">
+                  <a:solidFill>
+                    <a:schemeClr val="accent1"/>
+                  </a:solidFill>
+                </a14:hiddenFill>
+              </a:ext>
+            </a:extLst>
+          </p:spPr>
+          <p:style>
+            <a:lnRef idx="2">
+              <a:schemeClr val="accent1">
+                <a:shade val="50000"/>
+              </a:schemeClr>
+            </a:lnRef>
+            <a:fillRef idx="1">
+              <a:schemeClr val="accent1"/>
+            </a:fillRef>
+            <a:effectRef idx="0">
+              <a:schemeClr val="accent1"/>
+            </a:effectRef>
+            <a:fontRef idx="minor">
+              <a:schemeClr val="lt1"/>
+            </a:fontRef>
+          </p:style>
+          <p:txBody>
+            <a:bodyPr rtlCol="0" anchor="ctr"/>
+            <a:lstStyle/>
+            <a:p>
+              <a:pPr algn="ctr"/>
+              <a:endParaRPr lang="en-US"/>
+            </a:p>
+          </p:txBody>
+        </p:sp>
+      </p:grpSp>
       <p:sp>
         <p:nvSpPr>
           <p:cNvPr id="18" name="Rounded Rectangle 17"/>
@@ -2914,6 +2890,7 @@
             </a:avLst>
           </a:prstGeom>
           <a:noFill/>
+          <a:ln w="38100"/>
           <a:extLst>
             <a:ext uri="{909E8E84-426E-40DD-AFC4-6F175D3DCCD1}">
               <a14:hiddenFill xmlns:a14="http://schemas.microsoft.com/office/drawing/2010/main">
@@ -2940,48 +2917,95 @@
         </p:style>
         <p:txBody>
           <a:bodyPr rtlCol="0" anchor="ctr"/>
+          <a:lstStyle/>
           <a:p>
             <a:pPr algn="ctr"/>
             <a:endParaRPr lang="en-US"/>
           </a:p>
         </p:txBody>
       </p:sp>
-      <p:cxnSp>
-        <p:nvCxnSpPr>
-          <p:cNvPr id="19" name="Straight Arrow Connector 18"/>
-          <p:cNvCxnSpPr/>
+      <p:sp>
+        <p:nvSpPr>
+          <p:cNvPr id="3" name="Rectangle 2">
+            <a:extLst>
+              <a:ext uri="{FF2B5EF4-FFF2-40B4-BE49-F238E27FC236}">
+                <a16:creationId xmlns:a16="http://schemas.microsoft.com/office/drawing/2014/main" id="{91E1E0C5-FCC9-40E0-A5E2-F15DCFE73660}"/>
+              </a:ext>
+            </a:extLst>
+          </p:cNvPr>
+          <p:cNvSpPr/>
           <p:nvPr/>
-        </p:nvCxnSpPr>
+        </p:nvSpPr>
         <p:spPr>
-          <a:xfrm flipV="1">
-            <a:off x="4733290" y="4384675"/>
-            <a:ext cx="1790700" cy="1270"/>
+          <a:xfrm>
+            <a:off x="1333120" y="5538708"/>
+            <a:ext cx="4151521" cy="369332"/>
           </a:xfrm>
-          <a:prstGeom prst="straightConnector1">
+          <a:prstGeom prst="rect">
             <a:avLst/>
           </a:prstGeom>
-          <a:ln w="76200">
-            <a:solidFill>
-              <a:srgbClr val="FF0000"/>
-            </a:solidFill>
-            <a:tailEnd type="arrow"/>
-          </a:ln>
         </p:spPr>
-        <p:style>
-          <a:lnRef idx="1">
-            <a:schemeClr val="accent1"/>
-          </a:lnRef>
-          <a:fillRef idx="0">
-            <a:schemeClr val="accent1"/>
-          </a:fillRef>
-          <a:effectRef idx="0">
-            <a:schemeClr val="accent1"/>
-          </a:effectRef>
-          <a:fontRef idx="minor">
-            <a:schemeClr val="tx1"/>
-          </a:fontRef>
-        </p:style>
-      </p:cxnSp>
+        <p:txBody>
+          <a:bodyPr wrap="none">
+            <a:spAutoFit/>
+          </a:bodyPr>
+          <a:lstStyle/>
+          <a:p>
+            <a:r>
+              <a:rPr lang="en-US" i="1" dirty="0">
+                <a:latin typeface="Times New Roman" panose="02020603050405020304" pitchFamily="18" charset="0"/>
+                <a:cs typeface="Times New Roman" panose="02020603050405020304" pitchFamily="18" charset="0"/>
+              </a:rPr>
+              <a:t>Fig 3a. Before execution of Edit command.</a:t>
+            </a:r>
+            <a:endParaRPr lang="en-SG" dirty="0">
+              <a:latin typeface="Times New Roman" panose="02020603050405020304" pitchFamily="18" charset="0"/>
+              <a:cs typeface="Times New Roman" panose="02020603050405020304" pitchFamily="18" charset="0"/>
+            </a:endParaRPr>
+          </a:p>
+        </p:txBody>
+      </p:sp>
+      <p:sp>
+        <p:nvSpPr>
+          <p:cNvPr id="20" name="Rectangle 19">
+            <a:extLst>
+              <a:ext uri="{FF2B5EF4-FFF2-40B4-BE49-F238E27FC236}">
+                <a16:creationId xmlns:a16="http://schemas.microsoft.com/office/drawing/2014/main" id="{DE282696-58AD-47FB-9E81-9D303CB832AF}"/>
+              </a:ext>
+            </a:extLst>
+          </p:cNvPr>
+          <p:cNvSpPr/>
+          <p:nvPr/>
+        </p:nvSpPr>
+        <p:spPr>
+          <a:xfrm>
+            <a:off x="5961499" y="5538708"/>
+            <a:ext cx="4301177" cy="369332"/>
+          </a:xfrm>
+          <a:prstGeom prst="rect">
+            <a:avLst/>
+          </a:prstGeom>
+        </p:spPr>
+        <p:txBody>
+          <a:bodyPr wrap="none">
+            <a:spAutoFit/>
+          </a:bodyPr>
+          <a:lstStyle/>
+          <a:p>
+            <a:r>
+              <a:rPr lang="en-US" i="1" dirty="0">
+                <a:latin typeface="Times New Roman" panose="02020603050405020304" pitchFamily="18" charset="0"/>
+                <a:cs typeface="Times New Roman" panose="02020603050405020304" pitchFamily="18" charset="0"/>
+              </a:rPr>
+              <a:t>Fig 3b. Expected UI Output(Edit Command)</a:t>
+            </a:r>
+            <a:endParaRPr lang="en-SG" dirty="0">
+              <a:latin typeface="Times New Roman" panose="02020603050405020304" pitchFamily="18" charset="0"/>
+              <a:cs typeface="Times New Roman" panose="02020603050405020304" pitchFamily="18" charset="0"/>
+            </a:endParaRPr>
+          </a:p>
+        </p:txBody>
+      </p:sp>
     </p:spTree>
   </p:cSld>
   <p:clrMapOvr>
@@ -3241,6 +3265,8 @@
       </a:bgFillStyleLst>
     </a:fmtScheme>
   </a:themeElements>
+  <a:objectDefaults/>
+  <a:extraClrSchemeLst/>
   <a:extLst>
     <a:ext uri="{05A4C25C-085E-4340-85A3-A5531E510DB2}">
       <thm15:themeFamily xmlns:thm15="http://schemas.microsoft.com/office/thememl/2012/main" name="Office Theme" id="{62F939B6-93AF-4DB8-9C6B-D6C7DFDC589F}" vid="{4A3C46E8-61CC-4603-A589-7422A47A8E4A}"/>

</xml_diff>